<commit_message>
- Removed old version of the house layout to replace with a new file - Added layout of the top floor - Added top floor layout to presentation
</commit_message>
<xml_diff>
--- a/Presentation/Presentation_Matt_Aaron.pptx
+++ b/Presentation/Presentation_Matt_Aaron.pptx
@@ -124,7 +124,7 @@
   </p:defaultTextStyle>
   <p:extLst>
     <p:ext uri="{EFAFB233-063F-42B5-8137-9DF3F51BA10A}">
-      <p15:sldGuideLst xmlns:p15="http://schemas.microsoft.com/office/powerpoint/2012/main" xmlns="">
+      <p15:sldGuideLst xmlns="" xmlns:p15="http://schemas.microsoft.com/office/powerpoint/2012/main">
         <p15:guide id="1" orient="horz" pos="2160">
           <p15:clr>
             <a:srgbClr val="A4A3A4"/>
@@ -138,7 +138,7 @@
       </p15:sldGuideLst>
     </p:ext>
     <p:ext uri="{2D200454-40CA-4A62-9FC3-DE9A4176ACB9}">
-      <p15:notesGuideLst xmlns:p15="http://schemas.microsoft.com/office/powerpoint/2012/main" xmlns="">
+      <p15:notesGuideLst xmlns="" xmlns:p15="http://schemas.microsoft.com/office/powerpoint/2012/main">
         <p15:guide id="1" orient="horz" pos="2880">
           <p15:clr>
             <a:srgbClr val="A4A3A4"/>
@@ -244,7 +244,7 @@
             <a:fld id="{638B805B-5044-4500-A3EC-8C466530767F}" type="datetimeFigureOut">
               <a:rPr lang="en-GB" smtClean="0"/>
               <a:pPr/>
-              <a:t>16/10/2016</a:t>
+              <a:t>17/10/2016</a:t>
             </a:fld>
             <a:endParaRPr lang="en-GB"/>
           </a:p>
@@ -1773,7 +1773,7 @@
             <a:fld id="{B61BEF0D-F0BB-DE4B-95CE-6DB70DBA9567}" type="datetimeFigureOut">
               <a:rPr lang="en-US" dirty="0"/>
               <a:pPr/>
-              <a:t>10/16/2016</a:t>
+              <a:t>10/17/2016</a:t>
             </a:fld>
             <a:endParaRPr lang="en-US" dirty="0"/>
           </a:p>
@@ -2097,7 +2097,7 @@
             <a:fld id="{B61BEF0D-F0BB-DE4B-95CE-6DB70DBA9567}" type="datetimeFigureOut">
               <a:rPr lang="en-US" dirty="0"/>
               <a:pPr/>
-              <a:t>10/16/2016</a:t>
+              <a:t>10/17/2016</a:t>
             </a:fld>
             <a:endParaRPr lang="en-US" dirty="0"/>
           </a:p>
@@ -2345,7 +2345,7 @@
             <a:fld id="{B61BEF0D-F0BB-DE4B-95CE-6DB70DBA9567}" type="datetimeFigureOut">
               <a:rPr lang="en-US" dirty="0"/>
               <a:pPr/>
-              <a:t>10/16/2016</a:t>
+              <a:t>10/17/2016</a:t>
             </a:fld>
             <a:endParaRPr lang="en-US" dirty="0"/>
           </a:p>
@@ -2684,7 +2684,7 @@
             <a:fld id="{B61BEF0D-F0BB-DE4B-95CE-6DB70DBA9567}" type="datetimeFigureOut">
               <a:rPr lang="en-US" dirty="0"/>
               <a:pPr/>
-              <a:t>10/16/2016</a:t>
+              <a:t>10/17/2016</a:t>
             </a:fld>
             <a:endParaRPr lang="en-US" dirty="0"/>
           </a:p>
@@ -3031,7 +3031,7 @@
             <a:fld id="{B61BEF0D-F0BB-DE4B-95CE-6DB70DBA9567}" type="datetimeFigureOut">
               <a:rPr lang="en-US" dirty="0"/>
               <a:pPr/>
-              <a:t>10/16/2016</a:t>
+              <a:t>10/17/2016</a:t>
             </a:fld>
             <a:endParaRPr lang="en-US" dirty="0"/>
           </a:p>
@@ -3405,7 +3405,7 @@
             <a:fld id="{B61BEF0D-F0BB-DE4B-95CE-6DB70DBA9567}" type="datetimeFigureOut">
               <a:rPr lang="en-US" dirty="0"/>
               <a:pPr/>
-              <a:t>10/16/2016</a:t>
+              <a:t>10/17/2016</a:t>
             </a:fld>
             <a:endParaRPr lang="en-US" dirty="0"/>
           </a:p>
@@ -3875,7 +3875,7 @@
             <a:fld id="{B61BEF0D-F0BB-DE4B-95CE-6DB70DBA9567}" type="datetimeFigureOut">
               <a:rPr lang="en-US" dirty="0"/>
               <a:pPr/>
-              <a:t>10/16/2016</a:t>
+              <a:t>10/17/2016</a:t>
             </a:fld>
             <a:endParaRPr lang="en-US" dirty="0"/>
           </a:p>
@@ -4080,7 +4080,7 @@
             <a:fld id="{B61BEF0D-F0BB-DE4B-95CE-6DB70DBA9567}" type="datetimeFigureOut">
               <a:rPr lang="en-US" dirty="0"/>
               <a:pPr/>
-              <a:t>10/16/2016</a:t>
+              <a:t>10/17/2016</a:t>
             </a:fld>
             <a:endParaRPr lang="en-US" dirty="0"/>
           </a:p>
@@ -4291,7 +4291,7 @@
             <a:fld id="{B61BEF0D-F0BB-DE4B-95CE-6DB70DBA9567}" type="datetimeFigureOut">
               <a:rPr lang="en-US" dirty="0"/>
               <a:pPr/>
-              <a:t>10/16/2016</a:t>
+              <a:t>10/17/2016</a:t>
             </a:fld>
             <a:endParaRPr lang="en-US" dirty="0"/>
           </a:p>
@@ -4523,7 +4523,7 @@
             <a:fld id="{52647F38-B617-4D2F-AE0A-013F0C4D2C57}" type="datetimeFigureOut">
               <a:rPr lang="en-US" dirty="0"/>
               <a:pPr/>
-              <a:t>10/16/2016</a:t>
+              <a:t>10/17/2016</a:t>
             </a:fld>
             <a:endParaRPr lang="en-US" dirty="0"/>
           </a:p>
@@ -4771,7 +4771,7 @@
             <a:fld id="{B61BEF0D-F0BB-DE4B-95CE-6DB70DBA9567}" type="datetimeFigureOut">
               <a:rPr lang="en-US" dirty="0"/>
               <a:pPr/>
-              <a:t>10/16/2016</a:t>
+              <a:t>10/17/2016</a:t>
             </a:fld>
             <a:endParaRPr lang="en-US" dirty="0"/>
           </a:p>
@@ -5069,7 +5069,7 @@
             <a:fld id="{05BFA754-D5C3-4E66-96A6-867B257F58DC}" type="datetimeFigureOut">
               <a:rPr lang="en-US" dirty="0"/>
               <a:pPr/>
-              <a:t>10/16/2016</a:t>
+              <a:t>10/17/2016</a:t>
             </a:fld>
             <a:endParaRPr lang="en-US" dirty="0"/>
           </a:p>
@@ -5463,7 +5463,7 @@
             <a:fld id="{B61BEF0D-F0BB-DE4B-95CE-6DB70DBA9567}" type="datetimeFigureOut">
               <a:rPr lang="en-US" dirty="0"/>
               <a:pPr/>
-              <a:t>10/16/2016</a:t>
+              <a:t>10/17/2016</a:t>
             </a:fld>
             <a:endParaRPr lang="en-US" dirty="0"/>
           </a:p>
@@ -5612,7 +5612,7 @@
             <a:fld id="{B61BEF0D-F0BB-DE4B-95CE-6DB70DBA9567}" type="datetimeFigureOut">
               <a:rPr lang="en-US" dirty="0"/>
               <a:pPr/>
-              <a:t>10/16/2016</a:t>
+              <a:t>10/17/2016</a:t>
             </a:fld>
             <a:endParaRPr lang="en-US" dirty="0"/>
           </a:p>
@@ -5738,7 +5738,7 @@
             <a:fld id="{B61BEF0D-F0BB-DE4B-95CE-6DB70DBA9567}" type="datetimeFigureOut">
               <a:rPr lang="en-US" dirty="0"/>
               <a:pPr/>
-              <a:t>10/16/2016</a:t>
+              <a:t>10/17/2016</a:t>
             </a:fld>
             <a:endParaRPr lang="en-US" dirty="0"/>
           </a:p>
@@ -5993,7 +5993,7 @@
             <a:fld id="{B61BEF0D-F0BB-DE4B-95CE-6DB70DBA9567}" type="datetimeFigureOut">
               <a:rPr lang="en-US" dirty="0"/>
               <a:pPr/>
-              <a:t>10/16/2016</a:t>
+              <a:t>10/17/2016</a:t>
             </a:fld>
             <a:endParaRPr lang="en-US" dirty="0"/>
           </a:p>
@@ -6308,7 +6308,7 @@
             <a:fld id="{B61BEF0D-F0BB-DE4B-95CE-6DB70DBA9567}" type="datetimeFigureOut">
               <a:rPr lang="en-US" dirty="0"/>
               <a:pPr/>
-              <a:t>10/16/2016</a:t>
+              <a:t>10/17/2016</a:t>
             </a:fld>
             <a:endParaRPr lang="en-US" dirty="0"/>
           </a:p>
@@ -6659,7 +6659,7 @@
             <a:fld id="{B61BEF0D-F0BB-DE4B-95CE-6DB70DBA9567}" type="datetimeFigureOut">
               <a:rPr lang="en-US" dirty="0"/>
               <a:pPr/>
-              <a:t>10/16/2016</a:t>
+              <a:t>10/17/2016</a:t>
             </a:fld>
             <a:endParaRPr lang="en-US" dirty="0"/>
           </a:p>
@@ -7505,7 +7505,7 @@
       </p:sp>
       <p:pic>
         <p:nvPicPr>
-          <p:cNvPr id="2050" name="Picture 2" descr="C:\Users\Home\Desktop\Uni st00f\Level 6 Work Assignments\Final Group Project\Group Project Files\Art Work\Initial Designs\House Layout Bottom Floor.JPG"/>
+          <p:cNvPr id="1026" name="Picture 2" descr="C:\Users\Home\Desktop\Uni st00f\Level 6 Work Assignments\Final Group Project\Group Project Files\Art Work\Initial Designs\House Layout Top Floor.jpg"/>
           <p:cNvPicPr>
             <a:picLocks noChangeAspect="1" noChangeArrowheads="1"/>
           </p:cNvPicPr>
@@ -7526,8 +7526,8 @@
         </p:blipFill>
         <p:spPr bwMode="auto">
           <a:xfrm>
-            <a:off x="812902" y="2578100"/>
-            <a:ext cx="5751271" cy="3658544"/>
+            <a:off x="6564173" y="2578099"/>
+            <a:ext cx="4756602" cy="3658545"/>
           </a:xfrm>
           <a:prstGeom prst="rect">
             <a:avLst/>
@@ -7544,6 +7544,123 @@
           </a:extLst>
         </p:spPr>
       </p:pic>
+      <p:pic>
+        <p:nvPicPr>
+          <p:cNvPr id="1027" name="Picture 3" descr="C:\Users\Home\Desktop\Uni st00f\Level 6 Work Assignments\Final Group Project\Group Project Files\Art Work\Initial Designs\House Layout Bottom Floor.JPG"/>
+          <p:cNvPicPr>
+            <a:picLocks noChangeAspect="1" noChangeArrowheads="1"/>
+          </p:cNvPicPr>
+          <p:nvPr/>
+        </p:nvPicPr>
+        <p:blipFill>
+          <a:blip r:embed="rId3">
+            <a:extLst>
+              <a:ext uri="{28A0092B-C50C-407E-A947-70E740481C1C}">
+                <a14:useLocalDpi xmlns:a14="http://schemas.microsoft.com/office/drawing/2010/main" val="0"/>
+              </a:ext>
+            </a:extLst>
+          </a:blip>
+          <a:srcRect/>
+          <a:stretch>
+            <a:fillRect/>
+          </a:stretch>
+        </p:blipFill>
+        <p:spPr bwMode="auto">
+          <a:xfrm>
+            <a:off x="812900" y="2578098"/>
+            <a:ext cx="5751273" cy="3658545"/>
+          </a:xfrm>
+          <a:prstGeom prst="rect">
+            <a:avLst/>
+          </a:prstGeom>
+          <a:noFill/>
+          <a:extLst>
+            <a:ext uri="{909E8E84-426E-40DD-AFC4-6F175D3DCCD1}">
+              <a14:hiddenFill xmlns:a14="http://schemas.microsoft.com/office/drawing/2010/main">
+                <a:solidFill>
+                  <a:srgbClr val="FFFFFF"/>
+                </a:solidFill>
+              </a14:hiddenFill>
+            </a:ext>
+          </a:extLst>
+        </p:spPr>
+      </p:pic>
+      <p:sp>
+        <p:nvSpPr>
+          <p:cNvPr id="3" name="TextBox 2"/>
+          <p:cNvSpPr txBox="1"/>
+          <p:nvPr/>
+        </p:nvSpPr>
+        <p:spPr>
+          <a:xfrm>
+            <a:off x="812900" y="2869168"/>
+            <a:ext cx="1663600" cy="369332"/>
+          </a:xfrm>
+          <a:prstGeom prst="rect">
+            <a:avLst/>
+          </a:prstGeom>
+          <a:noFill/>
+        </p:spPr>
+        <p:txBody>
+          <a:bodyPr wrap="square" rtlCol="0">
+            <a:spAutoFit/>
+          </a:bodyPr>
+          <a:lstStyle/>
+          <a:p>
+            <a:r>
+              <a:rPr lang="en-GB" b="1" u="sng" dirty="0" smtClean="0">
+                <a:solidFill>
+                  <a:schemeClr val="bg1"/>
+                </a:solidFill>
+              </a:rPr>
+              <a:t>Bottom Floor</a:t>
+            </a:r>
+            <a:endParaRPr lang="en-GB" b="1" u="sng" dirty="0">
+              <a:solidFill>
+                <a:schemeClr val="bg1"/>
+              </a:solidFill>
+            </a:endParaRPr>
+          </a:p>
+        </p:txBody>
+      </p:sp>
+      <p:sp>
+        <p:nvSpPr>
+          <p:cNvPr id="7" name="TextBox 6"/>
+          <p:cNvSpPr txBox="1"/>
+          <p:nvPr/>
+        </p:nvSpPr>
+        <p:spPr>
+          <a:xfrm>
+            <a:off x="9461600" y="2869168"/>
+            <a:ext cx="1663600" cy="369332"/>
+          </a:xfrm>
+          <a:prstGeom prst="rect">
+            <a:avLst/>
+          </a:prstGeom>
+          <a:noFill/>
+        </p:spPr>
+        <p:txBody>
+          <a:bodyPr wrap="square" rtlCol="0">
+            <a:spAutoFit/>
+          </a:bodyPr>
+          <a:lstStyle/>
+          <a:p>
+            <a:r>
+              <a:rPr lang="en-GB" b="1" u="sng" dirty="0" smtClean="0">
+                <a:solidFill>
+                  <a:schemeClr val="bg1"/>
+                </a:solidFill>
+              </a:rPr>
+              <a:t>Top Floor</a:t>
+            </a:r>
+            <a:endParaRPr lang="en-GB" b="1" u="sng" dirty="0">
+              <a:solidFill>
+                <a:schemeClr val="bg1"/>
+              </a:solidFill>
+            </a:endParaRPr>
+          </a:p>
+        </p:txBody>
+      </p:sp>
     </p:spTree>
     <p:extLst>
       <p:ext uri="{BB962C8B-B14F-4D97-AF65-F5344CB8AC3E}">
@@ -8528,11 +8645,7 @@
             </a:r>
             <a:r>
               <a:rPr lang="en-GB" dirty="0" smtClean="0"/>
-              <a:t>			</a:t>
-            </a:r>
-            <a:r>
-              <a:rPr lang="en-GB" dirty="0" smtClean="0"/>
-              <a:t>Layers </a:t>
+              <a:t>			Layers </a:t>
             </a:r>
             <a:r>
               <a:rPr lang="en-GB" dirty="0"/>
@@ -9641,7 +9754,7 @@
   <a:extraClrSchemeLst/>
   <a:extLst>
     <a:ext uri="{05A4C25C-085E-4340-85A3-A5531E510DB2}">
-      <thm15:themeFamily xmlns:thm15="http://schemas.microsoft.com/office/thememl/2012/main" xmlns="" name="Organic" id="{28CDC826-8792-45C0-861B-85EB3ADEDA33}" vid="{7DAC20F1-423D-49E2-BD0B-50532748BAD0}"/>
+      <thm15:themeFamily xmlns="" xmlns:thm15="http://schemas.microsoft.com/office/thememl/2012/main" name="Organic" id="{28CDC826-8792-45C0-861B-85EB3ADEDA33}" vid="{7DAC20F1-423D-49E2-BD0B-50532748BAD0}"/>
     </a:ext>
   </a:extLst>
 </a:theme>
@@ -9902,7 +10015,7 @@
   <a:extraClrSchemeLst/>
   <a:extLst>
     <a:ext uri="{05A4C25C-085E-4340-85A3-A5531E510DB2}">
-      <thm15:themeFamily xmlns:thm15="http://schemas.microsoft.com/office/thememl/2012/main" xmlns="" name="Office Theme" id="{62F939B6-93AF-4DB8-9C6B-D6C7DFDC589F}" vid="{4A3C46E8-61CC-4603-A589-7422A47A8E4A}"/>
+      <thm15:themeFamily xmlns="" xmlns:thm15="http://schemas.microsoft.com/office/thememl/2012/main" name="Office Theme" id="{62F939B6-93AF-4DB8-9C6B-D6C7DFDC589F}" vid="{4A3C46E8-61CC-4603-A589-7422A47A8E4A}"/>
     </a:ext>
   </a:extLst>
 </a:theme>

</xml_diff>

<commit_message>
Presentation Update and Game code update (Clearing of the spawned furniture list)
</commit_message>
<xml_diff>
--- a/Presentation/Presentation_Matt_Aaron.pptx
+++ b/Presentation/Presentation_Matt_Aaron.pptx
@@ -124,7 +124,7 @@
   </p:defaultTextStyle>
   <p:extLst>
     <p:ext uri="{EFAFB233-063F-42B5-8137-9DF3F51BA10A}">
-      <p15:sldGuideLst xmlns="" xmlns:p15="http://schemas.microsoft.com/office/powerpoint/2012/main">
+      <p15:sldGuideLst xmlns:p15="http://schemas.microsoft.com/office/powerpoint/2012/main">
         <p15:guide id="1" orient="horz" pos="2160">
           <p15:clr>
             <a:srgbClr val="A4A3A4"/>
@@ -138,7 +138,7 @@
       </p15:sldGuideLst>
     </p:ext>
     <p:ext uri="{2D200454-40CA-4A62-9FC3-DE9A4176ACB9}">
-      <p15:notesGuideLst xmlns="" xmlns:p15="http://schemas.microsoft.com/office/powerpoint/2012/main">
+      <p15:notesGuideLst xmlns:p15="http://schemas.microsoft.com/office/powerpoint/2012/main">
         <p15:guide id="1" orient="horz" pos="2880">
           <p15:clr>
             <a:srgbClr val="A4A3A4"/>
@@ -244,7 +244,7 @@
             <a:fld id="{638B805B-5044-4500-A3EC-8C466530767F}" type="datetimeFigureOut">
               <a:rPr lang="en-GB" smtClean="0"/>
               <a:pPr/>
-              <a:t>17/10/2016</a:t>
+              <a:t>18/10/2016</a:t>
             </a:fld>
             <a:endParaRPr lang="en-GB"/>
           </a:p>
@@ -1773,7 +1773,7 @@
             <a:fld id="{B61BEF0D-F0BB-DE4B-95CE-6DB70DBA9567}" type="datetimeFigureOut">
               <a:rPr lang="en-US" dirty="0"/>
               <a:pPr/>
-              <a:t>10/17/2016</a:t>
+              <a:t>10/18/2016</a:t>
             </a:fld>
             <a:endParaRPr lang="en-US" dirty="0"/>
           </a:p>
@@ -2097,7 +2097,7 @@
             <a:fld id="{B61BEF0D-F0BB-DE4B-95CE-6DB70DBA9567}" type="datetimeFigureOut">
               <a:rPr lang="en-US" dirty="0"/>
               <a:pPr/>
-              <a:t>10/17/2016</a:t>
+              <a:t>10/18/2016</a:t>
             </a:fld>
             <a:endParaRPr lang="en-US" dirty="0"/>
           </a:p>
@@ -2345,7 +2345,7 @@
             <a:fld id="{B61BEF0D-F0BB-DE4B-95CE-6DB70DBA9567}" type="datetimeFigureOut">
               <a:rPr lang="en-US" dirty="0"/>
               <a:pPr/>
-              <a:t>10/17/2016</a:t>
+              <a:t>10/18/2016</a:t>
             </a:fld>
             <a:endParaRPr lang="en-US" dirty="0"/>
           </a:p>
@@ -2684,7 +2684,7 @@
             <a:fld id="{B61BEF0D-F0BB-DE4B-95CE-6DB70DBA9567}" type="datetimeFigureOut">
               <a:rPr lang="en-US" dirty="0"/>
               <a:pPr/>
-              <a:t>10/17/2016</a:t>
+              <a:t>10/18/2016</a:t>
             </a:fld>
             <a:endParaRPr lang="en-US" dirty="0"/>
           </a:p>
@@ -3031,7 +3031,7 @@
             <a:fld id="{B61BEF0D-F0BB-DE4B-95CE-6DB70DBA9567}" type="datetimeFigureOut">
               <a:rPr lang="en-US" dirty="0"/>
               <a:pPr/>
-              <a:t>10/17/2016</a:t>
+              <a:t>10/18/2016</a:t>
             </a:fld>
             <a:endParaRPr lang="en-US" dirty="0"/>
           </a:p>
@@ -3405,7 +3405,7 @@
             <a:fld id="{B61BEF0D-F0BB-DE4B-95CE-6DB70DBA9567}" type="datetimeFigureOut">
               <a:rPr lang="en-US" dirty="0"/>
               <a:pPr/>
-              <a:t>10/17/2016</a:t>
+              <a:t>10/18/2016</a:t>
             </a:fld>
             <a:endParaRPr lang="en-US" dirty="0"/>
           </a:p>
@@ -3875,7 +3875,7 @@
             <a:fld id="{B61BEF0D-F0BB-DE4B-95CE-6DB70DBA9567}" type="datetimeFigureOut">
               <a:rPr lang="en-US" dirty="0"/>
               <a:pPr/>
-              <a:t>10/17/2016</a:t>
+              <a:t>10/18/2016</a:t>
             </a:fld>
             <a:endParaRPr lang="en-US" dirty="0"/>
           </a:p>
@@ -4080,7 +4080,7 @@
             <a:fld id="{B61BEF0D-F0BB-DE4B-95CE-6DB70DBA9567}" type="datetimeFigureOut">
               <a:rPr lang="en-US" dirty="0"/>
               <a:pPr/>
-              <a:t>10/17/2016</a:t>
+              <a:t>10/18/2016</a:t>
             </a:fld>
             <a:endParaRPr lang="en-US" dirty="0"/>
           </a:p>
@@ -4291,7 +4291,7 @@
             <a:fld id="{B61BEF0D-F0BB-DE4B-95CE-6DB70DBA9567}" type="datetimeFigureOut">
               <a:rPr lang="en-US" dirty="0"/>
               <a:pPr/>
-              <a:t>10/17/2016</a:t>
+              <a:t>10/18/2016</a:t>
             </a:fld>
             <a:endParaRPr lang="en-US" dirty="0"/>
           </a:p>
@@ -4523,7 +4523,7 @@
             <a:fld id="{52647F38-B617-4D2F-AE0A-013F0C4D2C57}" type="datetimeFigureOut">
               <a:rPr lang="en-US" dirty="0"/>
               <a:pPr/>
-              <a:t>10/17/2016</a:t>
+              <a:t>10/18/2016</a:t>
             </a:fld>
             <a:endParaRPr lang="en-US" dirty="0"/>
           </a:p>
@@ -4771,7 +4771,7 @@
             <a:fld id="{B61BEF0D-F0BB-DE4B-95CE-6DB70DBA9567}" type="datetimeFigureOut">
               <a:rPr lang="en-US" dirty="0"/>
               <a:pPr/>
-              <a:t>10/17/2016</a:t>
+              <a:t>10/18/2016</a:t>
             </a:fld>
             <a:endParaRPr lang="en-US" dirty="0"/>
           </a:p>
@@ -5069,7 +5069,7 @@
             <a:fld id="{05BFA754-D5C3-4E66-96A6-867B257F58DC}" type="datetimeFigureOut">
               <a:rPr lang="en-US" dirty="0"/>
               <a:pPr/>
-              <a:t>10/17/2016</a:t>
+              <a:t>10/18/2016</a:t>
             </a:fld>
             <a:endParaRPr lang="en-US" dirty="0"/>
           </a:p>
@@ -5463,7 +5463,7 @@
             <a:fld id="{B61BEF0D-F0BB-DE4B-95CE-6DB70DBA9567}" type="datetimeFigureOut">
               <a:rPr lang="en-US" dirty="0"/>
               <a:pPr/>
-              <a:t>10/17/2016</a:t>
+              <a:t>10/18/2016</a:t>
             </a:fld>
             <a:endParaRPr lang="en-US" dirty="0"/>
           </a:p>
@@ -5612,7 +5612,7 @@
             <a:fld id="{B61BEF0D-F0BB-DE4B-95CE-6DB70DBA9567}" type="datetimeFigureOut">
               <a:rPr lang="en-US" dirty="0"/>
               <a:pPr/>
-              <a:t>10/17/2016</a:t>
+              <a:t>10/18/2016</a:t>
             </a:fld>
             <a:endParaRPr lang="en-US" dirty="0"/>
           </a:p>
@@ -5738,7 +5738,7 @@
             <a:fld id="{B61BEF0D-F0BB-DE4B-95CE-6DB70DBA9567}" type="datetimeFigureOut">
               <a:rPr lang="en-US" dirty="0"/>
               <a:pPr/>
-              <a:t>10/17/2016</a:t>
+              <a:t>10/18/2016</a:t>
             </a:fld>
             <a:endParaRPr lang="en-US" dirty="0"/>
           </a:p>
@@ -5993,7 +5993,7 @@
             <a:fld id="{B61BEF0D-F0BB-DE4B-95CE-6DB70DBA9567}" type="datetimeFigureOut">
               <a:rPr lang="en-US" dirty="0"/>
               <a:pPr/>
-              <a:t>10/17/2016</a:t>
+              <a:t>10/18/2016</a:t>
             </a:fld>
             <a:endParaRPr lang="en-US" dirty="0"/>
           </a:p>
@@ -6308,7 +6308,7 @@
             <a:fld id="{B61BEF0D-F0BB-DE4B-95CE-6DB70DBA9567}" type="datetimeFigureOut">
               <a:rPr lang="en-US" dirty="0"/>
               <a:pPr/>
-              <a:t>10/17/2016</a:t>
+              <a:t>10/18/2016</a:t>
             </a:fld>
             <a:endParaRPr lang="en-US" dirty="0"/>
           </a:p>
@@ -6659,7 +6659,7 @@
             <a:fld id="{B61BEF0D-F0BB-DE4B-95CE-6DB70DBA9567}" type="datetimeFigureOut">
               <a:rPr lang="en-US" dirty="0"/>
               <a:pPr/>
-              <a:t>10/17/2016</a:t>
+              <a:t>10/18/2016</a:t>
             </a:fld>
             <a:endParaRPr lang="en-US" dirty="0"/>
           </a:p>
@@ -7381,26 +7381,21 @@
           <a:p>
             <a:r>
               <a:rPr lang="en-GB" dirty="0"/>
-              <a:t> </a:t>
-            </a:r>
-            <a:r>
-              <a:rPr lang="en-GB" dirty="0" smtClean="0"/>
-              <a:t>Location will be in MC’s house in the countryside</a:t>
-            </a:r>
-          </a:p>
-          <a:p>
-            <a:r>
-              <a:rPr lang="en-GB" dirty="0" smtClean="0"/>
+              <a:t> Location will be in MC’s house in the countryside</a:t>
+            </a:r>
+          </a:p>
+          <a:p>
+            <a:r>
+              <a:rPr lang="en-GB" dirty="0"/>
               <a:t>Country house interior –  wood furniture, wooden flooring, painted and stone walls, old carpets</a:t>
             </a:r>
           </a:p>
           <a:p>
             <a:pPr lvl="0"/>
             <a:r>
-              <a:rPr lang="en-GB" dirty="0" smtClean="0"/>
+              <a:rPr lang="en-GB" dirty="0"/>
               <a:t>Old fashioned furniture to reflect MC’s age</a:t>
             </a:r>
-            <a:endParaRPr lang="en-GB" dirty="0"/>
           </a:p>
         </p:txBody>
       </p:sp>
@@ -7496,10 +7491,9 @@
           <a:lstStyle/>
           <a:p>
             <a:r>
-              <a:rPr lang="en-GB" dirty="0" smtClean="0"/>
+              <a:rPr lang="en-GB" dirty="0"/>
               <a:t>Floor Plan</a:t>
             </a:r>
-            <a:endParaRPr lang="en-GB" dirty="0"/>
           </a:p>
         </p:txBody>
       </p:sp>
@@ -7608,18 +7602,13 @@
           <a:lstStyle/>
           <a:p>
             <a:r>
-              <a:rPr lang="en-GB" b="1" u="sng" dirty="0" smtClean="0">
+              <a:rPr lang="en-GB" b="1" u="sng" dirty="0">
                 <a:solidFill>
                   <a:schemeClr val="bg1"/>
                 </a:solidFill>
               </a:rPr>
               <a:t>Bottom Floor</a:t>
             </a:r>
-            <a:endParaRPr lang="en-GB" b="1" u="sng" dirty="0">
-              <a:solidFill>
-                <a:schemeClr val="bg1"/>
-              </a:solidFill>
-            </a:endParaRPr>
           </a:p>
         </p:txBody>
       </p:sp>
@@ -7646,18 +7635,13 @@
           <a:lstStyle/>
           <a:p>
             <a:r>
-              <a:rPr lang="en-GB" b="1" u="sng" dirty="0" smtClean="0">
+              <a:rPr lang="en-GB" b="1" u="sng" dirty="0">
                 <a:solidFill>
                   <a:schemeClr val="bg1"/>
                 </a:solidFill>
               </a:rPr>
               <a:t>Top Floor</a:t>
             </a:r>
-            <a:endParaRPr lang="en-GB" b="1" u="sng" dirty="0">
-              <a:solidFill>
-                <a:schemeClr val="bg1"/>
-              </a:solidFill>
-            </a:endParaRPr>
           </a:p>
         </p:txBody>
       </p:sp>
@@ -7928,7 +7912,7 @@
         </p:spPr>
         <p:txBody>
           <a:bodyPr>
-            <a:normAutofit lnSpcReduction="10000"/>
+            <a:normAutofit fontScale="92500"/>
           </a:bodyPr>
           <a:lstStyle/>
           <a:p>
@@ -7957,6 +7941,13 @@
             <a:r>
               <a:rPr lang="en-GB" dirty="0"/>
               <a:t>Failure to complete memory within timer: fade to black to restart the memory.</a:t>
+            </a:r>
+          </a:p>
+          <a:p>
+            <a:pPr lvl="0"/>
+            <a:r>
+              <a:rPr lang="en-GB" dirty="0"/>
+              <a:t>Carer reset: Caught in a puzzle </a:t>
             </a:r>
           </a:p>
           <a:p>
@@ -8309,23 +8300,15 @@
           <a:p>
             <a:pPr lvl="0"/>
             <a:r>
-              <a:rPr lang="en-GB" dirty="0" smtClean="0"/>
-              <a:t>Short </a:t>
-            </a:r>
-            <a:r>
               <a:rPr lang="en-GB" dirty="0"/>
-              <a:t>term: Completing the immediate objective in finding the next memory and completing the puzzle</a:t>
+              <a:t>Short term: Completing the immediate objective in finding the next memory and completing the puzzle</a:t>
             </a:r>
           </a:p>
           <a:p>
             <a:pPr lvl="0"/>
             <a:r>
-              <a:rPr lang="en-GB" dirty="0" smtClean="0"/>
-              <a:t>Long </a:t>
-            </a:r>
-            <a:r>
               <a:rPr lang="en-GB" dirty="0"/>
-              <a:t>term: Working out what the story means.</a:t>
+              <a:t>Long term: Working out what the story means.</a:t>
             </a:r>
           </a:p>
         </p:txBody>
@@ -8500,7 +8483,7 @@
             <a:pPr lvl="0"/>
             <a:r>
               <a:rPr lang="en-GB" dirty="0"/>
-              <a:t>Take control and experience an ageing lonely MC struggling with Post-traumatic amnesia. Help him discover what he’s lost and find the truth behind his accident.</a:t>
+              <a:t>Take control and experience an ageing MC struggling with anterograde amnesia. Help him discover what he’s lost and find the truth behind his accident.</a:t>
             </a:r>
           </a:p>
           <a:p>
@@ -8609,13 +8592,8 @@
           <a:p>
             <a:r>
               <a:rPr lang="en-GB" dirty="0"/>
-              <a:t>Our core emotional </a:t>
-            </a:r>
-            <a:r>
-              <a:rPr lang="en-GB" dirty="0" smtClean="0"/>
-              <a:t>responses</a:t>
-            </a:r>
-            <a:endParaRPr lang="en-GB" dirty="0"/>
+              <a:t>Our core emotional responses</a:t>
+            </a:r>
           </a:p>
           <a:p>
             <a:r>
@@ -8625,48 +8603,35 @@
           </a:p>
           <a:p>
             <a:pPr lvl="1"/>
-            <a:endParaRPr lang="en-GB" dirty="0" smtClean="0"/>
+            <a:endParaRPr lang="en-GB" dirty="0"/>
           </a:p>
           <a:p>
             <a:pPr lvl="1"/>
-            <a:endParaRPr lang="en-GB" dirty="0" smtClean="0"/>
+            <a:endParaRPr lang="en-GB" dirty="0"/>
           </a:p>
           <a:p>
             <a:pPr marL="457200" lvl="1" indent="0">
               <a:buNone/>
             </a:pPr>
             <a:r>
-              <a:rPr lang="en-GB" dirty="0" smtClean="0"/>
-              <a:t>Stanley Parable				Torpor </a:t>
-            </a:r>
-            <a:r>
               <a:rPr lang="en-GB" dirty="0"/>
-              <a:t>	</a:t>
-            </a:r>
-            <a:r>
-              <a:rPr lang="en-GB" dirty="0" smtClean="0"/>
-              <a:t>			Layers </a:t>
+              <a:t>Stanley Parable				Torpor 				Layers of Fear </a:t>
+            </a:r>
+          </a:p>
+          <a:p>
+            <a:pPr marL="457200" lvl="1" indent="0">
+              <a:buNone/>
+            </a:pPr>
+            <a:r>
+              <a:rPr lang="en-GB" dirty="0" err="1"/>
+              <a:t>Momento</a:t>
+            </a:r>
+            <a:r>
+              <a:rPr lang="en-GB"/>
+              <a:t>										50 First dates</a:t>
             </a:r>
             <a:r>
               <a:rPr lang="en-GB" dirty="0"/>
-              <a:t>of Fear </a:t>
-            </a:r>
-            <a:endParaRPr lang="en-GB" dirty="0" smtClean="0"/>
-          </a:p>
-          <a:p>
-            <a:pPr marL="457200" lvl="1" indent="0">
-              <a:buNone/>
-            </a:pPr>
-            <a:r>
-              <a:rPr lang="en-GB" dirty="0" err="1" smtClean="0"/>
-              <a:t>Momento</a:t>
-            </a:r>
-            <a:r>
-              <a:rPr lang="en-GB" smtClean="0"/>
-              <a:t>										50 First dates</a:t>
-            </a:r>
-            <a:r>
-              <a:rPr lang="en-GB" dirty="0" smtClean="0"/>
               <a:t>				</a:t>
             </a:r>
           </a:p>
@@ -8768,7 +8733,7 @@
           <a:p>
             <a:pPr lvl="0"/>
             <a:r>
-              <a:rPr lang="en-GB" dirty="0" smtClean="0"/>
+              <a:rPr lang="en-GB" dirty="0"/>
               <a:t>MC suffering from anterograde amnesia</a:t>
             </a:r>
           </a:p>
@@ -8777,22 +8742,21 @@
               <a:buNone/>
             </a:pPr>
             <a:r>
-              <a:rPr lang="en-GB" dirty="0" smtClean="0"/>
+              <a:rPr lang="en-GB" dirty="0"/>
               <a:t>	</a:t>
             </a:r>
             <a:r>
-              <a:rPr lang="en-GB" sz="2400" dirty="0" smtClean="0"/>
+              <a:rPr lang="en-GB" sz="2400" dirty="0"/>
               <a:t>- MC is trying to piece together memories of someone they love and what has happened to them</a:t>
             </a:r>
-            <a:endParaRPr lang="en-GB" dirty="0" smtClean="0"/>
+            <a:endParaRPr lang="en-GB" dirty="0"/>
           </a:p>
           <a:p>
             <a:pPr lvl="0"/>
             <a:r>
-              <a:rPr lang="en-GB" dirty="0" smtClean="0"/>
+              <a:rPr lang="en-GB" dirty="0"/>
               <a:t>Seven sections of the game</a:t>
             </a:r>
-            <a:endParaRPr lang="en-GB" dirty="0"/>
           </a:p>
           <a:p>
             <a:pPr marL="0" indent="0">
@@ -8800,15 +8764,7 @@
             </a:pPr>
             <a:r>
               <a:rPr lang="en-GB" dirty="0"/>
-              <a:t>		</a:t>
-            </a:r>
-            <a:r>
-              <a:rPr lang="en-GB" dirty="0" smtClean="0"/>
-              <a:t>- Player experiences </a:t>
-            </a:r>
-            <a:r>
-              <a:rPr lang="en-GB" dirty="0"/>
-              <a:t>the increasing struggles of the MC</a:t>
+              <a:t>		- Player experiences the increasing struggles of the MC</a:t>
             </a:r>
           </a:p>
           <a:p>
@@ -8911,7 +8867,7 @@
           <a:p>
             <a:r>
               <a:rPr lang="en-GB" dirty="0"/>
-              <a:t>Memory 3 – Person with you is female</a:t>
+              <a:t>Memory 3 – Person with you is closely connected to you</a:t>
             </a:r>
           </a:p>
           <a:p>
@@ -9019,30 +8975,16 @@
           <a:p>
             <a:pPr lvl="0"/>
             <a:r>
-              <a:rPr lang="en-GB" dirty="0" smtClean="0"/>
-              <a:t>Seeking, Management &amp; </a:t>
-            </a:r>
-            <a:r>
               <a:rPr lang="en-GB" dirty="0"/>
-              <a:t>Puzzle (Jigsaw</a:t>
-            </a:r>
-            <a:r>
-              <a:rPr lang="en-GB" dirty="0" smtClean="0"/>
-              <a:t>) – Easy and Hard fun</a:t>
-            </a:r>
-            <a:endParaRPr lang="en-GB" dirty="0"/>
+              <a:t>Seeking, Management &amp; Puzzle (Jigsaw) – Easy and Hard fun</a:t>
+            </a:r>
           </a:p>
           <a:p>
             <a:pPr lvl="0"/>
             <a:r>
               <a:rPr lang="en-GB" dirty="0"/>
-              <a:t>For each memory, </a:t>
-            </a:r>
-            <a:r>
-              <a:rPr lang="en-GB" dirty="0" smtClean="0"/>
-              <a:t>players must find specific items</a:t>
-            </a:r>
-            <a:endParaRPr lang="en-GB" dirty="0"/>
+              <a:t>For each memory, players must find specific items</a:t>
+            </a:r>
           </a:p>
           <a:p>
             <a:pPr marL="0" indent="0">
@@ -9059,13 +9001,8 @@
             </a:pPr>
             <a:r>
               <a:rPr lang="en-GB" dirty="0"/>
-              <a:t>		-Seek out the items on the note in any of the </a:t>
-            </a:r>
-            <a:r>
-              <a:rPr lang="en-GB" dirty="0" smtClean="0"/>
-              <a:t>rooms open</a:t>
-            </a:r>
-            <a:endParaRPr lang="en-GB" dirty="0"/>
+              <a:t>		-Seek out the items on the note in any of the rooms open</a:t>
+            </a:r>
           </a:p>
           <a:p>
             <a:pPr lvl="0"/>
@@ -9089,11 +9026,7 @@
             </a:pPr>
             <a:r>
               <a:rPr lang="en-GB" dirty="0"/>
-              <a:t>		-The more players find and solve memories the harder the jigsaw puzzle will </a:t>
-            </a:r>
-            <a:r>
-              <a:rPr lang="en-GB" dirty="0" smtClean="0"/>
-              <a:t>become</a:t>
+              <a:t>		-The more players find and solve memories the harder the jigsaw puzzle will become</a:t>
             </a:r>
           </a:p>
           <a:p>
@@ -9102,13 +9035,8 @@
             </a:pPr>
             <a:r>
               <a:rPr lang="en-GB" dirty="0"/>
-              <a:t>	</a:t>
-            </a:r>
-            <a:r>
-              <a:rPr lang="en-GB" dirty="0" smtClean="0"/>
-              <a:t>	- Players must also be aware of The Carer and avoid being ‘caught’ doing a puzzle</a:t>
-            </a:r>
-            <a:endParaRPr lang="en-GB" dirty="0"/>
+              <a:t>		- Players must also be aware of The Carer and avoid being ‘caught’ doing a puzzle</a:t>
+            </a:r>
           </a:p>
         </p:txBody>
       </p:sp>
@@ -9166,10 +9094,9 @@
           <a:lstStyle/>
           <a:p>
             <a:r>
-              <a:rPr lang="en-GB" dirty="0" smtClean="0"/>
+              <a:rPr lang="en-GB" dirty="0"/>
               <a:t>The Carer</a:t>
             </a:r>
-            <a:endParaRPr lang="en-GB" dirty="0"/>
           </a:p>
         </p:txBody>
       </p:sp>
@@ -9186,25 +9113,13 @@
         <p:spPr/>
         <p:txBody>
           <a:bodyPr>
-            <a:normAutofit/>
+            <a:normAutofit lnSpcReduction="10000"/>
           </a:bodyPr>
           <a:lstStyle/>
           <a:p>
             <a:r>
-              <a:rPr lang="en-GB" dirty="0" smtClean="0"/>
-              <a:t>Designed to cause panic when players are completing a puzzle</a:t>
-            </a:r>
-          </a:p>
-          <a:p>
-            <a:pPr marL="0" indent="0">
-              <a:buNone/>
-            </a:pPr>
-            <a:endParaRPr lang="en-GB" dirty="0" smtClean="0"/>
-          </a:p>
-          <a:p>
-            <a:r>
-              <a:rPr lang="en-GB" dirty="0" smtClean="0"/>
-              <a:t>MC is scared of The Carer; The Carer just wants to help</a:t>
+              <a:rPr lang="en-GB" dirty="0"/>
+              <a:t>Designed to cause panic through perceived threat when players are completing a puzzle</a:t>
             </a:r>
           </a:p>
           <a:p>
@@ -9215,7 +9130,19 @@
           </a:p>
           <a:p>
             <a:r>
-              <a:rPr lang="en-GB" dirty="0" smtClean="0"/>
+              <a:rPr lang="en-GB" dirty="0"/>
+              <a:t>MC is scared of The Carer; The Carer just wants to help</a:t>
+            </a:r>
+          </a:p>
+          <a:p>
+            <a:pPr marL="0" indent="0">
+              <a:buNone/>
+            </a:pPr>
+            <a:endParaRPr lang="en-GB" dirty="0"/>
+          </a:p>
+          <a:p>
+            <a:r>
+              <a:rPr lang="en-GB" dirty="0"/>
               <a:t>The Carer will take the form of a mannequin to unsettle players, portraying how the MC feels about The Carer</a:t>
             </a:r>
           </a:p>
@@ -9366,11 +9293,7 @@
             </a:pPr>
             <a:r>
               <a:rPr lang="en-GB" dirty="0"/>
-              <a:t>		</a:t>
-            </a:r>
-            <a:r>
-              <a:rPr lang="en-GB" dirty="0" smtClean="0"/>
-              <a:t>-All furniture is moved around the rooms after a length of time</a:t>
+              <a:t>		-All furniture is moved around the rooms after a length of time</a:t>
             </a:r>
           </a:p>
           <a:p>
@@ -9452,10 +9375,15 @@
             <p:ph idx="1"/>
           </p:nvPr>
         </p:nvSpPr>
-        <p:spPr/>
+        <p:spPr>
+          <a:xfrm>
+            <a:off x="828262" y="2586749"/>
+            <a:ext cx="6298095" cy="3318936"/>
+          </a:xfrm>
+        </p:spPr>
         <p:txBody>
           <a:bodyPr>
-            <a:normAutofit/>
+            <a:normAutofit fontScale="92500" lnSpcReduction="20000"/>
           </a:bodyPr>
           <a:lstStyle/>
           <a:p>
@@ -9470,8 +9398,8 @@
               <a:buNone/>
             </a:pPr>
             <a:r>
-              <a:rPr lang="en-GB" dirty="0"/>
-              <a:t>-Narratively Post-traumatic amnesia is portrayed through a timer rearranging the furniture within the rooms.   </a:t>
+              <a:rPr lang="en-GB" sz="2400" dirty="0"/>
+              <a:t>-Narratively anterograde amnesia is portrayed through a timer rearranging the furniture within the rooms.   </a:t>
             </a:r>
           </a:p>
           <a:p>
@@ -9480,37 +9408,51 @@
               <a:rPr lang="en-GB" dirty="0"/>
               <a:t>Further, panic from the mechanics </a:t>
             </a:r>
-            <a:endParaRPr lang="en-GB" dirty="0" smtClean="0"/>
           </a:p>
           <a:p>
             <a:pPr marL="0" lvl="0" indent="0">
               <a:buNone/>
             </a:pPr>
             <a:r>
-              <a:rPr lang="en-GB" dirty="0" smtClean="0"/>
-              <a:t>	- Completing </a:t>
-            </a:r>
-            <a:r>
               <a:rPr lang="en-GB" dirty="0"/>
-              <a:t>puzzles before the </a:t>
-            </a:r>
-            <a:r>
-              <a:rPr lang="en-GB" dirty="0" smtClean="0"/>
-              <a:t>reset</a:t>
-            </a:r>
-            <a:endParaRPr lang="en-GB" dirty="0"/>
+              <a:t>	- Completing puzzles before the reset</a:t>
+            </a:r>
           </a:p>
           <a:p>
             <a:pPr marL="0" indent="0">
               <a:buNone/>
             </a:pPr>
             <a:r>
-              <a:rPr lang="en-GB" dirty="0" smtClean="0"/>
+              <a:rPr lang="en-GB" dirty="0"/>
               <a:t>	- Avoiding The Carer from catching the player during a puzzle </a:t>
             </a:r>
           </a:p>
         </p:txBody>
       </p:sp>
+      <p:pic>
+        <p:nvPicPr>
+          <p:cNvPr id="4" name="Picture 3"/>
+          <p:cNvPicPr>
+            <a:picLocks noChangeAspect="1"/>
+          </p:cNvPicPr>
+          <p:nvPr/>
+        </p:nvPicPr>
+        <p:blipFill>
+          <a:blip r:embed="rId2"/>
+          <a:stretch>
+            <a:fillRect/>
+          </a:stretch>
+        </p:blipFill>
+        <p:spPr>
+          <a:xfrm>
+            <a:off x="7022917" y="1819968"/>
+            <a:ext cx="4503161" cy="4503161"/>
+          </a:xfrm>
+          <a:prstGeom prst="rect">
+            <a:avLst/>
+          </a:prstGeom>
+        </p:spPr>
+      </p:pic>
     </p:spTree>
     <p:extLst>
       <p:ext uri="{BB962C8B-B14F-4D97-AF65-F5344CB8AC3E}">
@@ -9754,7 +9696,7 @@
   <a:extraClrSchemeLst/>
   <a:extLst>
     <a:ext uri="{05A4C25C-085E-4340-85A3-A5531E510DB2}">
-      <thm15:themeFamily xmlns="" xmlns:thm15="http://schemas.microsoft.com/office/thememl/2012/main" name="Organic" id="{28CDC826-8792-45C0-861B-85EB3ADEDA33}" vid="{7DAC20F1-423D-49E2-BD0B-50532748BAD0}"/>
+      <thm15:themeFamily xmlns:thm15="http://schemas.microsoft.com/office/thememl/2012/main" name="Organic" id="{28CDC826-8792-45C0-861B-85EB3ADEDA33}" vid="{7DAC20F1-423D-49E2-BD0B-50532748BAD0}"/>
     </a:ext>
   </a:extLst>
 </a:theme>
@@ -10015,7 +9957,7 @@
   <a:extraClrSchemeLst/>
   <a:extLst>
     <a:ext uri="{05A4C25C-085E-4340-85A3-A5531E510DB2}">
-      <thm15:themeFamily xmlns="" xmlns:thm15="http://schemas.microsoft.com/office/thememl/2012/main" name="Office Theme" id="{62F939B6-93AF-4DB8-9C6B-D6C7DFDC589F}" vid="{4A3C46E8-61CC-4603-A589-7422A47A8E4A}"/>
+      <thm15:themeFamily xmlns:thm15="http://schemas.microsoft.com/office/thememl/2012/main" name="Office Theme" id="{62F939B6-93AF-4DB8-9C6B-D6C7DFDC589F}" vid="{4A3C46E8-61CC-4603-A589-7422A47A8E4A}"/>
     </a:ext>
   </a:extLst>
 </a:theme>

</xml_diff>